<commit_message>
update pipeline overview chart
</commit_message>
<xml_diff>
--- a/LectureFiles/cbw/2018/RNASeq_Module2_Lecture.pptx
+++ b/LectureFiles/cbw/2018/RNASeq_Module2_Lecture.pptx
@@ -290,7 +290,7 @@
               <a:pPr>
                 <a:defRPr/>
               </a:pPr>
-              <a:t>5/22/18</a:t>
+              <a:t>5/29/18</a:t>
             </a:fld>
             <a:endParaRPr lang="en-US"/>
           </a:p>
@@ -505,7 +505,7 @@
               <a:pPr>
                 <a:defRPr/>
               </a:pPr>
-              <a:t>5/22/18</a:t>
+              <a:t>5/29/18</a:t>
             </a:fld>
             <a:endParaRPr lang="en-US"/>
           </a:p>
@@ -4715,7 +4715,7 @@
               <a:pPr>
                 <a:defRPr/>
               </a:pPr>
-              <a:t>5/22/18</a:t>
+              <a:t>5/29/18</a:t>
             </a:fld>
             <a:endParaRPr lang="en-US"/>
           </a:p>
@@ -19364,20 +19364,55 @@
           <a:lstStyle/>
           <a:p>
             <a:r>
-              <a:rPr lang="en-US">
+              <a:rPr lang="en-US" dirty="0" smtClean="0">
                 <a:latin typeface="Calibri" charset="0"/>
                 <a:ea typeface="ＭＳ Ｐゴシック" charset="0"/>
               </a:rPr>
-              <a:t>Bowtie/Tophat/Cufflinks/Cuffdiff </a:t>
+              <a:t>HISAT2/</a:t>
+            </a:r>
+            <a:r>
+              <a:rPr lang="en-US" dirty="0" err="1" smtClean="0">
+                <a:latin typeface="Calibri" charset="0"/>
+                <a:ea typeface="ＭＳ Ｐゴシック" charset="0"/>
+              </a:rPr>
+              <a:t>StringTie</a:t>
+            </a:r>
+            <a:r>
+              <a:rPr lang="en-US" dirty="0" smtClean="0">
+                <a:latin typeface="Calibri" charset="0"/>
+                <a:ea typeface="ＭＳ Ｐゴシック" charset="0"/>
+              </a:rPr>
+              <a:t>/</a:t>
+            </a:r>
+            <a:r>
+              <a:rPr lang="en-US" dirty="0" err="1" smtClean="0">
+                <a:latin typeface="Calibri" charset="0"/>
+                <a:ea typeface="ＭＳ Ｐゴシック" charset="0"/>
+              </a:rPr>
+              <a:t>Ballgown</a:t>
+            </a:r>
+            <a:r>
+              <a:rPr lang="en-US" dirty="0" smtClean="0">
+                <a:latin typeface="Calibri" charset="0"/>
+                <a:ea typeface="ＭＳ Ｐゴシック" charset="0"/>
+              </a:rPr>
+              <a:t> </a:t>
+            </a:r>
+            <a:r>
+              <a:rPr lang="en-US" dirty="0">
+                <a:latin typeface="Calibri" charset="0"/>
+                <a:ea typeface="ＭＳ Ｐゴシック" charset="0"/>
+              </a:rPr>
+              <a:t/>
             </a:r>
             <a:br>
-              <a:rPr lang="en-US">
+              <a:rPr lang="en-US" dirty="0">
                 <a:latin typeface="Calibri" charset="0"/>
                 <a:ea typeface="ＭＳ Ｐゴシック" charset="0"/>
               </a:rPr>
             </a:br>
             <a:r>
-              <a:rPr lang="en-US">
+              <a:rPr lang="en-US" dirty="0">
                 <a:latin typeface="Calibri" charset="0"/>
                 <a:ea typeface="ＭＳ Ｐゴシック" charset="0"/>
               </a:rPr>

</xml_diff>